<commit_message>
update README files to reflect MVP scope and post-MVP priorities
</commit_message>
<xml_diff>
--- a/README.pptx
+++ b/README.pptx
@@ -13,6 +13,7 @@
     <p:sldId id="261" r:id="rId7"/>
     <p:sldId id="262" r:id="rId8"/>
     <p:sldId id="263" r:id="rId9"/>
+    <p:sldId id="264" r:id="rId10"/>
   </p:sldIdLst>
   <p:sldSz cx="9144000" cy="6858000" type="screen4x3"/>
   <p:notesSz cx="6858000" cy="9144000"/>
@@ -3179,7 +3180,7 @@
             </a:r>
             <a:r>
               <a:rPr/>
-              <a:t>Set</a:t>
+              <a:t>SET</a:t>
             </a:r>
             <a:r>
               <a:rPr/>
@@ -3287,7 +3288,16 @@
             </a:pPr>
             <a:r>
               <a:rPr/>
-              <a:t>To be determined. Who are the stakeholders?</a:t>
+              <a:t>The intended audience is SET players at In Time Tec.</a:t>
+            </a:r>
+          </a:p>
+          <a:p>
+            <a:pPr lvl="0" marL="0" indent="0">
+              <a:buNone/>
+            </a:pPr>
+            <a:r>
+              <a:rPr/>
+              <a:t>Other stakeholders include Eddy and Trevor. When appropriate, they will simulate roles such as business analyst, product owner technical architect, technical lead, technical account manager, et cetera.</a:t>
             </a:r>
           </a:p>
         </p:txBody>
@@ -3368,7 +3378,21 @@
             </a:pPr>
             <a:r>
               <a:rPr/>
-              <a:t>Scope: TBD</a:t>
+              <a:t>Scope:</a:t>
+            </a:r>
+          </a:p>
+          <a:p>
+            <a:pPr lvl="1"/>
+            <a:r>
+              <a:rPr/>
+              <a:t>One player versus computer;</a:t>
+            </a:r>
+          </a:p>
+          <a:p>
+            <a:pPr lvl="1"/>
+            <a:r>
+              <a:rPr/>
+              <a:t>Web UI.</a:t>
             </a:r>
           </a:p>
         </p:txBody>
@@ -3415,7 +3439,7 @@
             </a:pPr>
             <a:r>
               <a:rPr/>
-              <a:t>Application</a:t>
+              <a:t>MVP:</a:t>
             </a:r>
             <a:r>
               <a:rPr/>
@@ -3423,7 +3447,7 @@
             </a:r>
             <a:r>
               <a:rPr/>
-              <a:t>Scope:</a:t>
+              <a:t>Specifically</a:t>
             </a:r>
             <a:r>
               <a:rPr/>
@@ -3431,15 +3455,7 @@
             </a:r>
             <a:r>
               <a:rPr/>
-              <a:t>Overall</a:t>
-            </a:r>
-            <a:r>
-              <a:rPr/>
-              <a:t> </a:t>
-            </a:r>
-            <a:r>
-              <a:rPr/>
-              <a:t>Design</a:t>
+              <a:t>Excluded</a:t>
             </a:r>
           </a:p>
         </p:txBody>
@@ -3462,21 +3478,56 @@
             <a:pPr lvl="1"/>
             <a:r>
               <a:rPr/>
-              <a:t>What end-user experience will we create? Console? Graphical? Both?</a:t>
+              <a:t>No authn/authz;</a:t>
             </a:r>
           </a:p>
           <a:p>
             <a:pPr lvl="1"/>
             <a:r>
               <a:rPr/>
-              <a:t>How will the application be delivered? Native executable? (And what platforms?) Web app? Both?</a:t>
+              <a:t>No console or native UI;</a:t>
             </a:r>
           </a:p>
           <a:p>
             <a:pPr lvl="1"/>
             <a:r>
               <a:rPr/>
-              <a:t>Multi-user? Authentication and authorization?</a:t>
+              <a:t>No leaderboard;</a:t>
+            </a:r>
+          </a:p>
+          <a:p>
+            <a:pPr lvl="1"/>
+            <a:r>
+              <a:rPr/>
+              <a:t>No multiplayer;</a:t>
+            </a:r>
+          </a:p>
+          <a:p>
+            <a:pPr lvl="1"/>
+            <a:r>
+              <a:rPr/>
+              <a:t>No saved games;</a:t>
+            </a:r>
+          </a:p>
+          <a:p>
+            <a:pPr lvl="1"/>
+            <a:r>
+              <a:rPr/>
+              <a:t>No saved scores;</a:t>
+            </a:r>
+          </a:p>
+          <a:p>
+            <a:pPr lvl="1"/>
+            <a:r>
+              <a:rPr/>
+              <a:t>No statistics or analysis;</a:t>
+            </a:r>
+          </a:p>
+          <a:p>
+            <a:pPr lvl="1"/>
+            <a:r>
+              <a:rPr/>
+              <a:t>No user data.</a:t>
             </a:r>
           </a:p>
         </p:txBody>
@@ -3539,7 +3590,15 @@
             </a:r>
             <a:r>
               <a:rPr/>
-              <a:t>Features</a:t>
+              <a:t>Overall</a:t>
+            </a:r>
+            <a:r>
+              <a:rPr/>
+              <a:t> </a:t>
+            </a:r>
+            <a:r>
+              <a:rPr/>
+              <a:t>Design</a:t>
             </a:r>
           </a:p>
         </p:txBody>
@@ -3559,40 +3618,17 @@
           <a:bodyPr/>
           <a:lstStyle/>
           <a:p>
-            <a:pPr lvl="0" marL="0" indent="0">
-              <a:buNone/>
-            </a:pPr>
-            <a:r>
-              <a:rPr/>
-              <a:t>To be determined.</a:t>
-            </a:r>
-          </a:p>
-          <a:p>
             <a:pPr lvl="1"/>
             <a:r>
               <a:rPr/>
-              <a:t>User data?</a:t>
+              <a:t>End-user experience and application delivery: Web UI.</a:t>
             </a:r>
           </a:p>
           <a:p>
             <a:pPr lvl="1"/>
             <a:r>
               <a:rPr/>
-              <a:t>Persistance?</a:t>
-            </a:r>
-          </a:p>
-          <a:p>
-            <a:pPr lvl="1"/>
-            <a:r>
-              <a:rPr/>
-              <a:t>Leaderboard?</a:t>
-            </a:r>
-          </a:p>
-          <a:p>
-            <a:pPr lvl="1"/>
-            <a:r>
-              <a:rPr/>
-              <a:t>Saved scores?</a:t>
+              <a:t>Multi-user with authentication and authorization.</a:t>
             </a:r>
           </a:p>
         </p:txBody>
@@ -3639,7 +3675,7 @@
             </a:pPr>
             <a:r>
               <a:rPr/>
-              <a:t>Tool</a:t>
+              <a:t>Application</a:t>
             </a:r>
             <a:r>
               <a:rPr/>
@@ -3647,7 +3683,47 @@
             </a:r>
             <a:r>
               <a:rPr/>
-              <a:t>Stack</a:t>
+              <a:t>Scope:</a:t>
+            </a:r>
+            <a:r>
+              <a:rPr/>
+              <a:t> </a:t>
+            </a:r>
+            <a:r>
+              <a:rPr/>
+              <a:t>Post-MVP</a:t>
+            </a:r>
+            <a:r>
+              <a:rPr/>
+              <a:t> </a:t>
+            </a:r>
+            <a:r>
+              <a:rPr/>
+              <a:t>Features</a:t>
+            </a:r>
+            <a:r>
+              <a:rPr/>
+              <a:t> </a:t>
+            </a:r>
+            <a:r>
+              <a:rPr/>
+              <a:t>/</a:t>
+            </a:r>
+            <a:r>
+              <a:rPr/>
+              <a:t> </a:t>
+            </a:r>
+            <a:r>
+              <a:rPr/>
+              <a:t>Stretch</a:t>
+            </a:r>
+            <a:r>
+              <a:rPr/>
+              <a:t> </a:t>
+            </a:r>
+            <a:r>
+              <a:rPr/>
+              <a:t>Goals</a:t>
             </a:r>
           </a:p>
         </p:txBody>
@@ -3667,45 +3743,40 @@
           <a:bodyPr/>
           <a:lstStyle/>
           <a:p>
+            <a:pPr lvl="0" marL="0" indent="0">
+              <a:buNone/>
+            </a:pPr>
+            <a:r>
+              <a:rPr/>
+              <a:t>In order of most important to least:</a:t>
+            </a:r>
+          </a:p>
+          <a:p>
             <a:pPr lvl="1"/>
             <a:r>
               <a:rPr/>
-              <a:t>IDE: Visual Studio (edition TBD)</a:t>
+              <a:t>Multiplayer;</a:t>
             </a:r>
           </a:p>
           <a:p>
             <a:pPr lvl="1"/>
             <a:r>
               <a:rPr/>
-              <a:t>Language: C# + .NET 5</a:t>
+              <a:t>Authn and user data;</a:t>
             </a:r>
           </a:p>
           <a:p>
             <a:pPr lvl="1"/>
             <a:r>
               <a:rPr/>
-              <a:t>Revision control: GitHub</a:t>
+              <a:t>Saved scores, saved games, and leaderboard.</a:t>
             </a:r>
           </a:p>
           <a:p>
             <a:pPr lvl="1"/>
             <a:r>
               <a:rPr/>
-              <a:t>Progress tracking: GitHub</a:t>
-            </a:r>
-          </a:p>
-          <a:p>
-            <a:pPr lvl="1"/>
-            <a:r>
-              <a:rPr/>
-              <a:t>Testing: xUnit.net (?)</a:t>
-            </a:r>
-          </a:p>
-          <a:p>
-            <a:pPr lvl="1"/>
-            <a:r>
-              <a:rPr/>
-              <a:t>DevOps CI/CD pipeline: out of scope</a:t>
+              <a:t>Should we consider an improved computer player?</a:t>
             </a:r>
           </a:p>
         </p:txBody>
@@ -3752,7 +3823,7 @@
             </a:pPr>
             <a:r>
               <a:rPr/>
-              <a:t>Progress</a:t>
+              <a:t>Tool</a:t>
             </a:r>
             <a:r>
               <a:rPr/>
@@ -3760,7 +3831,7 @@
             </a:r>
             <a:r>
               <a:rPr/>
-              <a:t>Tracking</a:t>
+              <a:t>Stack</a:t>
             </a:r>
           </a:p>
         </p:txBody>
@@ -3783,42 +3854,42 @@
             <a:pPr lvl="1"/>
             <a:r>
               <a:rPr/>
-              <a:t>Stories</a:t>
+              <a:t>IDE: Visual Studio (edition TBD)</a:t>
             </a:r>
           </a:p>
           <a:p>
             <a:pPr lvl="1"/>
             <a:r>
               <a:rPr/>
-              <a:t>Acceptance criteria</a:t>
+              <a:t>Language: C# + .NET 5</a:t>
             </a:r>
           </a:p>
           <a:p>
             <a:pPr lvl="1"/>
             <a:r>
               <a:rPr/>
-              <a:t>Current experience</a:t>
+              <a:t>Revision control: GitHub</a:t>
             </a:r>
           </a:p>
           <a:p>
             <a:pPr lvl="1"/>
             <a:r>
               <a:rPr/>
-              <a:t>Desired experience</a:t>
+              <a:t>Progress tracking: GitHub</a:t>
             </a:r>
           </a:p>
           <a:p>
             <a:pPr lvl="1"/>
             <a:r>
               <a:rPr/>
-              <a:t>Any blockers?</a:t>
+              <a:t>Testing: xUnit.net (?)</a:t>
             </a:r>
           </a:p>
           <a:p>
             <a:pPr lvl="1"/>
             <a:r>
               <a:rPr/>
-              <a:t>Is the story blocking anything?</a:t>
+              <a:t>DevOps CI/CD pipeline: out of scope</a:t>
             </a:r>
           </a:p>
         </p:txBody>
@@ -3829,6 +3900,119 @@
 </file>
 
 <file path=ppt/slides/slide8.xml><?xml version="1.0" encoding="utf-8"?>
+<p:sld xmlns:a="http://schemas.openxmlformats.org/drawingml/2006/main" xmlns:r="http://schemas.openxmlformats.org/officeDocument/2006/relationships" xmlns:p="http://schemas.openxmlformats.org/presentationml/2006/main">
+  <p:cSld>
+    <p:spTree>
+      <p:nvGrpSpPr>
+        <p:cNvPr id="1" name=""/>
+        <p:cNvGrpSpPr/>
+        <p:nvPr/>
+      </p:nvGrpSpPr>
+      <p:grpSpPr>
+        <a:xfrm>
+          <a:off x="0" y="0"/>
+          <a:ext cx="0" cy="0"/>
+          <a:chOff x="0" y="0"/>
+          <a:chExt cx="0" cy="0"/>
+        </a:xfrm>
+      </p:grpSpPr>
+      <p:sp>
+        <p:nvSpPr>
+          <p:cNvPr id="2" name="Title 1"/>
+          <p:cNvSpPr>
+            <a:spLocks noGrp="1"/>
+          </p:cNvSpPr>
+          <p:nvPr>
+            <p:ph type="title"/>
+          </p:nvPr>
+        </p:nvSpPr>
+        <p:spPr/>
+        <p:txBody>
+          <a:bodyPr/>
+          <a:lstStyle/>
+          <a:p>
+            <a:pPr lvl="0" marL="0" indent="0">
+              <a:buNone/>
+            </a:pPr>
+            <a:r>
+              <a:rPr/>
+              <a:t>Progress</a:t>
+            </a:r>
+            <a:r>
+              <a:rPr/>
+              <a:t> </a:t>
+            </a:r>
+            <a:r>
+              <a:rPr/>
+              <a:t>Tracking</a:t>
+            </a:r>
+          </a:p>
+        </p:txBody>
+      </p:sp>
+      <p:sp>
+        <p:nvSpPr>
+          <p:cNvPr id="3" name="Content Placeholder 2"/>
+          <p:cNvSpPr>
+            <a:spLocks noGrp="1"/>
+          </p:cNvSpPr>
+          <p:nvPr>
+            <p:ph idx="1"/>
+          </p:nvPr>
+        </p:nvSpPr>
+        <p:spPr/>
+        <p:txBody>
+          <a:bodyPr/>
+          <a:lstStyle/>
+          <a:p>
+            <a:pPr lvl="1"/>
+            <a:r>
+              <a:rPr/>
+              <a:t>Stories</a:t>
+            </a:r>
+          </a:p>
+          <a:p>
+            <a:pPr lvl="1"/>
+            <a:r>
+              <a:rPr/>
+              <a:t>Acceptance criteria</a:t>
+            </a:r>
+          </a:p>
+          <a:p>
+            <a:pPr lvl="1"/>
+            <a:r>
+              <a:rPr/>
+              <a:t>Current experience</a:t>
+            </a:r>
+          </a:p>
+          <a:p>
+            <a:pPr lvl="1"/>
+            <a:r>
+              <a:rPr/>
+              <a:t>Desired experience</a:t>
+            </a:r>
+          </a:p>
+          <a:p>
+            <a:pPr lvl="1"/>
+            <a:r>
+              <a:rPr/>
+              <a:t>Any blockers?</a:t>
+            </a:r>
+          </a:p>
+          <a:p>
+            <a:pPr lvl="1"/>
+            <a:r>
+              <a:rPr/>
+              <a:t>Is the story blocking anything?</a:t>
+            </a:r>
+          </a:p>
+        </p:txBody>
+      </p:sp>
+    </p:spTree>
+  </p:cSld>
+</p:sld>
+</file>
+
+<file path=ppt/slides/slide9.xml><?xml version="1.0" encoding="utf-8"?>
 <p:sld xmlns:a="http://schemas.openxmlformats.org/drawingml/2006/main" xmlns:r="http://schemas.openxmlformats.org/officeDocument/2006/relationships" xmlns:p="http://schemas.openxmlformats.org/presentationml/2006/main">
   <p:cSld>
     <p:spTree>

</xml_diff>